<commit_message>
add iops leiden winter tgtbf poster presentation draft
</commit_message>
<xml_diff>
--- a/2015_2016/20151115 opencon/hartgerink opencon slides.pptx
+++ b/2015_2016/20151115 opencon/hartgerink opencon slides.pptx
@@ -212,7 +212,7 @@
           <a:p>
             <a:fld id="{82367A76-6A31-4B1C-AE36-5D61FF3FFE00}" type="datetimeFigureOut">
               <a:rPr lang="en-US" smtClean="0"/>
-              <a:t>11/12/2015</a:t>
+              <a:t>11/14/2015</a:t>
             </a:fld>
             <a:endParaRPr lang="en-US"/>
           </a:p>
@@ -1966,7 +1966,7 @@
           <a:p>
             <a:fld id="{4AAD347D-5ACD-4C99-B74B-A9C85AD731AF}" type="datetimeFigureOut">
               <a:rPr lang="en-US" dirty="0"/>
-              <a:t>11/12/2015</a:t>
+              <a:t>11/14/2015</a:t>
             </a:fld>
             <a:endParaRPr lang="en-US" dirty="0"/>
           </a:p>
@@ -2236,7 +2236,7 @@
           <a:p>
             <a:fld id="{4509A250-FF31-4206-8172-F9D3106AACB1}" type="datetimeFigureOut">
               <a:rPr lang="en-US" dirty="0"/>
-              <a:t>11/12/2015</a:t>
+              <a:t>11/14/2015</a:t>
             </a:fld>
             <a:endParaRPr lang="en-US" dirty="0"/>
           </a:p>
@@ -2425,7 +2425,7 @@
           <a:p>
             <a:fld id="{4509A250-FF31-4206-8172-F9D3106AACB1}" type="datetimeFigureOut">
               <a:rPr lang="en-US" dirty="0"/>
-              <a:t>11/12/2015</a:t>
+              <a:t>11/14/2015</a:t>
             </a:fld>
             <a:endParaRPr lang="en-US" dirty="0"/>
           </a:p>
@@ -2693,7 +2693,7 @@
           <a:p>
             <a:fld id="{4509A250-FF31-4206-8172-F9D3106AACB1}" type="datetimeFigureOut">
               <a:rPr lang="en-US" dirty="0"/>
-              <a:t>11/12/2015</a:t>
+              <a:t>11/14/2015</a:t>
             </a:fld>
             <a:endParaRPr lang="en-US" dirty="0"/>
           </a:p>
@@ -3029,7 +3029,7 @@
           <a:p>
             <a:fld id="{4509A250-FF31-4206-8172-F9D3106AACB1}" type="datetimeFigureOut">
               <a:rPr lang="en-US" dirty="0"/>
-              <a:t>11/12/2015</a:t>
+              <a:t>11/14/2015</a:t>
             </a:fld>
             <a:endParaRPr lang="en-US" dirty="0"/>
           </a:p>
@@ -3647,7 +3647,7 @@
           <a:p>
             <a:fld id="{4509A250-FF31-4206-8172-F9D3106AACB1}" type="datetimeFigureOut">
               <a:rPr lang="en-US" dirty="0"/>
-              <a:t>11/12/2015</a:t>
+              <a:t>11/14/2015</a:t>
             </a:fld>
             <a:endParaRPr lang="en-US" dirty="0"/>
           </a:p>
@@ -4502,7 +4502,7 @@
           <a:p>
             <a:fld id="{4509A250-FF31-4206-8172-F9D3106AACB1}" type="datetimeFigureOut">
               <a:rPr lang="en-US" dirty="0"/>
-              <a:t>11/12/2015</a:t>
+              <a:t>11/14/2015</a:t>
             </a:fld>
             <a:endParaRPr lang="en-US" dirty="0"/>
           </a:p>
@@ -4667,7 +4667,7 @@
           <a:p>
             <a:fld id="{4509A250-FF31-4206-8172-F9D3106AACB1}" type="datetimeFigureOut">
               <a:rPr lang="en-US" dirty="0"/>
-              <a:t>11/12/2015</a:t>
+              <a:t>11/14/2015</a:t>
             </a:fld>
             <a:endParaRPr lang="en-US" dirty="0"/>
           </a:p>
@@ -4842,7 +4842,7 @@
           <a:p>
             <a:fld id="{4509A250-FF31-4206-8172-F9D3106AACB1}" type="datetimeFigureOut">
               <a:rPr lang="en-US" dirty="0"/>
-              <a:t>11/12/2015</a:t>
+              <a:t>11/14/2015</a:t>
             </a:fld>
             <a:endParaRPr lang="en-US" dirty="0"/>
           </a:p>
@@ -5007,7 +5007,7 @@
           <a:p>
             <a:fld id="{4509A250-FF31-4206-8172-F9D3106AACB1}" type="datetimeFigureOut">
               <a:rPr lang="en-US" dirty="0"/>
-              <a:t>11/12/2015</a:t>
+              <a:t>11/14/2015</a:t>
             </a:fld>
             <a:endParaRPr lang="en-US" dirty="0"/>
           </a:p>
@@ -5249,7 +5249,7 @@
           <a:p>
             <a:fld id="{9796027F-7875-4030-9381-8BD8C4F21935}" type="datetimeFigureOut">
               <a:rPr lang="en-US" dirty="0"/>
-              <a:t>11/12/2015</a:t>
+              <a:t>11/14/2015</a:t>
             </a:fld>
             <a:endParaRPr lang="en-US" dirty="0"/>
           </a:p>
@@ -5536,7 +5536,7 @@
           <a:p>
             <a:fld id="{9796027F-7875-4030-9381-8BD8C4F21935}" type="datetimeFigureOut">
               <a:rPr lang="en-US" dirty="0"/>
-              <a:t>11/12/2015</a:t>
+              <a:t>11/14/2015</a:t>
             </a:fld>
             <a:endParaRPr lang="en-US" dirty="0"/>
           </a:p>
@@ -5975,7 +5975,7 @@
           <a:p>
             <a:fld id="{9796027F-7875-4030-9381-8BD8C4F21935}" type="datetimeFigureOut">
               <a:rPr lang="en-US" dirty="0"/>
-              <a:t>11/12/2015</a:t>
+              <a:t>11/14/2015</a:t>
             </a:fld>
             <a:endParaRPr lang="en-US" dirty="0"/>
           </a:p>
@@ -6088,7 +6088,7 @@
           <a:p>
             <a:fld id="{4509A250-FF31-4206-8172-F9D3106AACB1}" type="datetimeFigureOut">
               <a:rPr lang="en-US" dirty="0"/>
-              <a:t>11/12/2015</a:t>
+              <a:t>11/14/2015</a:t>
             </a:fld>
             <a:endParaRPr lang="en-US" dirty="0"/>
           </a:p>
@@ -6178,7 +6178,7 @@
           <a:p>
             <a:fld id="{4509A250-FF31-4206-8172-F9D3106AACB1}" type="datetimeFigureOut">
               <a:rPr lang="en-US" dirty="0"/>
-              <a:t>11/12/2015</a:t>
+              <a:t>11/14/2015</a:t>
             </a:fld>
             <a:endParaRPr lang="en-US" dirty="0"/>
           </a:p>
@@ -6452,7 +6452,7 @@
           <a:p>
             <a:fld id="{4509A250-FF31-4206-8172-F9D3106AACB1}" type="datetimeFigureOut">
               <a:rPr lang="en-US" dirty="0"/>
-              <a:t>11/12/2015</a:t>
+              <a:t>11/14/2015</a:t>
             </a:fld>
             <a:endParaRPr lang="en-US" dirty="0"/>
           </a:p>
@@ -6722,7 +6722,7 @@
           <a:p>
             <a:fld id="{4509A250-FF31-4206-8172-F9D3106AACB1}" type="datetimeFigureOut">
               <a:rPr lang="en-US" dirty="0"/>
-              <a:t>11/12/2015</a:t>
+              <a:t>11/14/2015</a:t>
             </a:fld>
             <a:endParaRPr lang="en-US" dirty="0"/>
           </a:p>
@@ -7146,7 +7146,7 @@
           <a:p>
             <a:fld id="{4AAD347D-5ACD-4C99-B74B-A9C85AD731AF}" type="datetimeFigureOut">
               <a:rPr lang="en-US" dirty="0"/>
-              <a:t>11/12/2015</a:t>
+              <a:t>11/14/2015</a:t>
             </a:fld>
             <a:endParaRPr lang="en-US" dirty="0"/>
           </a:p>
@@ -7732,6 +7732,14 @@
   <p:clrMapOvr>
     <a:masterClrMapping/>
   </p:clrMapOvr>
+  <mc:AlternateContent xmlns:mc="http://schemas.openxmlformats.org/markup-compatibility/2006">
+    <mc:Choice xmlns:p14="http://schemas.microsoft.com/office/powerpoint/2010/main" Requires="p14">
+      <p:transition spd="slow" p14:dur="2000" advTm="2585"/>
+    </mc:Choice>
+    <mc:Fallback>
+      <p:transition spd="slow" advTm="2585"/>
+    </mc:Fallback>
+  </mc:AlternateContent>
   <p:timing>
     <p:tnLst>
       <p:par>

</xml_diff>